<commit_message>
Added slide about users, and some more references.
</commit_message>
<xml_diff>
--- a/Resource/Bio_Presentation.pptx
+++ b/Resource/Bio_Presentation.pptx
@@ -5,7 +5,7 @@
     <p:sldMasterId id="2147483781" r:id="rId1"/>
   </p:sldMasterIdLst>
   <p:notesMasterIdLst>
-    <p:notesMasterId r:id="rId11"/>
+    <p:notesMasterId r:id="rId12"/>
   </p:notesMasterIdLst>
   <p:sldIdLst>
     <p:sldId id="264" r:id="rId2"/>
@@ -14,9 +14,10 @@
     <p:sldId id="269" r:id="rId5"/>
     <p:sldId id="259" r:id="rId6"/>
     <p:sldId id="268" r:id="rId7"/>
-    <p:sldId id="270" r:id="rId8"/>
-    <p:sldId id="271" r:id="rId9"/>
-    <p:sldId id="265" r:id="rId10"/>
+    <p:sldId id="272" r:id="rId8"/>
+    <p:sldId id="270" r:id="rId9"/>
+    <p:sldId id="271" r:id="rId10"/>
+    <p:sldId id="265" r:id="rId11"/>
   </p:sldIdLst>
   <p:sldSz cx="10080625" cy="7559675"/>
   <p:notesSz cx="7772400" cy="10058400"/>
@@ -205,7 +206,7 @@
           <a:p>
             <a:fld id="{70339714-F46E-4F4C-8054-51BCA6566ED1}" type="datetimeFigureOut">
               <a:rPr lang="en-US" smtClean="0"/>
-              <a:t>2/13/2016</a:t>
+              <a:t>2/14/2016</a:t>
             </a:fld>
             <a:endParaRPr lang="en-US"/>
           </a:p>
@@ -789,7 +790,7 @@
           <a:p>
             <a:fld id="{AF8DD645-B9B4-46EE-B031-35C24A448A04}" type="datetimeFigureOut">
               <a:rPr lang="en-US" smtClean="0"/>
-              <a:t>2/13/2016</a:t>
+              <a:t>2/14/2016</a:t>
             </a:fld>
             <a:endParaRPr lang="en-US" dirty="0"/>
           </a:p>
@@ -5058,7 +5059,7 @@
           <a:p>
             <a:fld id="{48F9C5B0-21BA-48EA-B067-5E37072B4F18}" type="datetimeFigureOut">
               <a:rPr lang="en-US" smtClean="0"/>
-              <a:t>2/13/2016</a:t>
+              <a:t>2/14/2016</a:t>
             </a:fld>
             <a:endParaRPr lang="en-US" dirty="0"/>
           </a:p>
@@ -6680,6 +6681,241 @@
 </p:sld>
 </file>
 
+<file path=ppt/slides/slide10.xml><?xml version="1.0" encoding="utf-8"?>
+<p:sld xmlns:a="http://schemas.openxmlformats.org/drawingml/2006/main" xmlns:r="http://schemas.openxmlformats.org/officeDocument/2006/relationships" xmlns:p="http://schemas.openxmlformats.org/presentationml/2006/main">
+  <p:cSld>
+    <p:spTree>
+      <p:nvGrpSpPr>
+        <p:cNvPr id="1" name=""/>
+        <p:cNvGrpSpPr/>
+        <p:nvPr/>
+      </p:nvGrpSpPr>
+      <p:grpSpPr>
+        <a:xfrm>
+          <a:off x="0" y="0"/>
+          <a:ext cx="0" cy="0"/>
+          <a:chOff x="0" y="0"/>
+          <a:chExt cx="0" cy="0"/>
+        </a:xfrm>
+      </p:grpSpPr>
+      <p:sp>
+        <p:nvSpPr>
+          <p:cNvPr id="2" name="Title 1"/>
+          <p:cNvSpPr>
+            <a:spLocks noGrp="1"/>
+          </p:cNvSpPr>
+          <p:nvPr>
+            <p:ph type="title"/>
+          </p:nvPr>
+        </p:nvSpPr>
+        <p:spPr>
+          <a:xfrm>
+            <a:off x="504031" y="671973"/>
+            <a:ext cx="8568531" cy="658063"/>
+          </a:xfrm>
+        </p:spPr>
+        <p:txBody>
+          <a:bodyPr/>
+          <a:lstStyle/>
+          <a:p>
+            <a:r>
+              <a:rPr lang="en-US" dirty="0" smtClean="0"/>
+              <a:t>Citations</a:t>
+            </a:r>
+            <a:endParaRPr lang="en-US" dirty="0"/>
+          </a:p>
+        </p:txBody>
+      </p:sp>
+      <p:sp>
+        <p:nvSpPr>
+          <p:cNvPr id="3" name="Content Placeholder 2"/>
+          <p:cNvSpPr>
+            <a:spLocks noGrp="1"/>
+          </p:cNvSpPr>
+          <p:nvPr>
+            <p:ph idx="1"/>
+          </p:nvPr>
+        </p:nvSpPr>
+        <p:spPr>
+          <a:xfrm>
+            <a:off x="504031" y="3917372"/>
+            <a:ext cx="8568531" cy="4270663"/>
+          </a:xfrm>
+        </p:spPr>
+        <p:txBody>
+          <a:bodyPr>
+            <a:normAutofit fontScale="92500" lnSpcReduction="20000"/>
+          </a:bodyPr>
+          <a:lstStyle/>
+          <a:p>
+            <a:r>
+              <a:rPr lang="en-US" sz="2800" dirty="0" err="1"/>
+              <a:t>SciStarter</a:t>
+            </a:r>
+            <a:r>
+              <a:rPr lang="en-US" sz="2800" dirty="0"/>
+              <a:t>. (</a:t>
+            </a:r>
+            <a:r>
+              <a:rPr lang="en-US" sz="2800" dirty="0" err="1"/>
+              <a:t>n.d.</a:t>
+            </a:r>
+            <a:r>
+              <a:rPr lang="en-US" sz="2800" dirty="0"/>
+              <a:t>). Retrieved February 05, 2016, from http://scistarter.com/page/Citizen Science.html </a:t>
+            </a:r>
+          </a:p>
+          <a:p>
+            <a:r>
+              <a:rPr lang="en-US" sz="2800" dirty="0" smtClean="0">
+                <a:hlinkClick r:id="rId2"/>
+              </a:rPr>
+              <a:t>https</a:t>
+            </a:r>
+            <a:r>
+              <a:rPr lang="en-US" sz="2800" dirty="0">
+                <a:hlinkClick r:id="rId2"/>
+              </a:rPr>
+              <a:t>://</a:t>
+            </a:r>
+            <a:r>
+              <a:rPr lang="en-US" sz="2800" dirty="0" smtClean="0">
+                <a:hlinkClick r:id="rId2"/>
+              </a:rPr>
+              <a:t>upload.wikimedia.org/wikipedia/commons/2/2d/Birdwatchers_taking_a_closer_look_through_their_binoculars.jpg</a:t>
+            </a:r>
+            <a:endParaRPr lang="en-US" sz="2800" dirty="0" smtClean="0"/>
+          </a:p>
+          <a:p>
+            <a:r>
+              <a:rPr lang="en-US" sz="2800" dirty="0" smtClean="0">
+                <a:hlinkClick r:id="rId3"/>
+              </a:rPr>
+              <a:t>http://www.ebird.org</a:t>
+            </a:r>
+            <a:endParaRPr lang="en-US" sz="2800" dirty="0" smtClean="0"/>
+          </a:p>
+          <a:p>
+            <a:r>
+              <a:rPr lang="en-US" sz="2800" dirty="0" smtClean="0">
+                <a:hlinkClick r:id="rId4"/>
+              </a:rPr>
+              <a:t>http</a:t>
+            </a:r>
+            <a:r>
+              <a:rPr lang="en-US" sz="2800" dirty="0">
+                <a:hlinkClick r:id="rId4"/>
+              </a:rPr>
+              <a:t>://fold.it/portal</a:t>
+            </a:r>
+            <a:r>
+              <a:rPr lang="en-US" sz="2800" dirty="0" smtClean="0">
+                <a:hlinkClick r:id="rId4"/>
+              </a:rPr>
+              <a:t>/</a:t>
+            </a:r>
+            <a:endParaRPr lang="en-US" sz="2800" dirty="0" smtClean="0"/>
+          </a:p>
+          <a:p>
+            <a:r>
+              <a:rPr lang="en-US" sz="2800" dirty="0">
+                <a:hlinkClick r:id="rId5"/>
+              </a:rPr>
+              <a:t>http://</a:t>
+            </a:r>
+            <a:r>
+              <a:rPr lang="en-US" sz="2800" dirty="0" smtClean="0">
+                <a:hlinkClick r:id="rId5"/>
+              </a:rPr>
+              <a:t>www.pacificwhale.org/research/great-whale-count</a:t>
+            </a:r>
+            <a:endParaRPr lang="en-US" sz="2800" dirty="0" smtClean="0"/>
+          </a:p>
+          <a:p>
+            <a:r>
+              <a:rPr lang="en-US" sz="2800" dirty="0">
+                <a:hlinkClick r:id="rId6"/>
+              </a:rPr>
+              <a:t>http://</a:t>
+            </a:r>
+            <a:r>
+              <a:rPr lang="en-US" sz="2800" dirty="0" smtClean="0">
+                <a:hlinkClick r:id="rId6"/>
+              </a:rPr>
+              <a:t>blog.aba.org/2011/12/ebird-changed-my-life.html</a:t>
+            </a:r>
+            <a:endParaRPr lang="en-US" sz="2800" dirty="0" smtClean="0"/>
+          </a:p>
+          <a:p>
+            <a:r>
+              <a:rPr lang="en-US" sz="2800">
+                <a:hlinkClick r:id="rId7"/>
+              </a:rPr>
+              <a:t>http://</a:t>
+            </a:r>
+            <a:r>
+              <a:rPr lang="en-US" sz="2800">
+                <a:hlinkClick r:id="rId7"/>
+              </a:rPr>
+              <a:t>ebird.org/content/ebird/news/lasortemap</a:t>
+            </a:r>
+            <a:r>
+              <a:rPr lang="en-US" sz="2800" smtClean="0">
+                <a:hlinkClick r:id="rId7"/>
+              </a:rPr>
+              <a:t>/</a:t>
+            </a:r>
+            <a:endParaRPr lang="en-US" sz="2800" smtClean="0"/>
+          </a:p>
+          <a:p>
+            <a:pPr marL="0" indent="0">
+              <a:buNone/>
+            </a:pPr>
+            <a:endParaRPr lang="en-US" sz="2800" dirty="0" smtClean="0"/>
+          </a:p>
+          <a:p>
+            <a:endParaRPr lang="en-US" sz="2800" dirty="0" smtClean="0"/>
+          </a:p>
+          <a:p>
+            <a:endParaRPr lang="en-US" sz="2800" dirty="0" smtClean="0"/>
+          </a:p>
+          <a:p>
+            <a:endParaRPr lang="en-US" sz="2800" dirty="0" smtClean="0"/>
+          </a:p>
+          <a:p>
+            <a:endParaRPr lang="en-US" sz="2800" dirty="0" smtClean="0"/>
+          </a:p>
+          <a:p>
+            <a:pPr marL="0" indent="0">
+              <a:buNone/>
+            </a:pPr>
+            <a:endParaRPr lang="en-US" sz="2800" dirty="0"/>
+          </a:p>
+          <a:p>
+            <a:endParaRPr lang="en-US" dirty="0"/>
+          </a:p>
+        </p:txBody>
+      </p:sp>
+    </p:spTree>
+    <p:extLst>
+      <p:ext uri="{BB962C8B-B14F-4D97-AF65-F5344CB8AC3E}">
+        <p14:creationId xmlns:p14="http://schemas.microsoft.com/office/powerpoint/2010/main" val="255573761"/>
+      </p:ext>
+    </p:extLst>
+  </p:cSld>
+  <p:clrMapOvr>
+    <a:masterClrMapping/>
+  </p:clrMapOvr>
+  <p:timing>
+    <p:tnLst>
+      <p:par>
+        <p:cTn id="1" dur="indefinite" restart="never" nodeType="tmRoot"/>
+      </p:par>
+    </p:tnLst>
+  </p:timing>
+</p:sld>
+</file>
+
 <file path=ppt/slides/slide2.xml><?xml version="1.0" encoding="utf-8"?>
 <p:sld xmlns:a="http://schemas.openxmlformats.org/drawingml/2006/main" xmlns:r="http://schemas.openxmlformats.org/officeDocument/2006/relationships" xmlns:p="http://schemas.openxmlformats.org/presentationml/2006/main">
   <p:cSld>
@@ -7067,7 +7303,7 @@
         </p:blipFill>
         <p:spPr bwMode="auto">
           <a:xfrm>
-            <a:off x="7076209" y="2783228"/>
+            <a:off x="7003472" y="3576303"/>
             <a:ext cx="2900507" cy="1950953"/>
           </a:xfrm>
           <a:prstGeom prst="rect">
@@ -7107,8 +7343,8 @@
         </p:blipFill>
         <p:spPr>
           <a:xfrm>
-            <a:off x="4238466" y="1100147"/>
-            <a:ext cx="2463671" cy="2339243"/>
+            <a:off x="4238466" y="322119"/>
+            <a:ext cx="3283085" cy="3117272"/>
           </a:xfrm>
           <a:prstGeom prst="rect">
             <a:avLst/>
@@ -7137,8 +7373,8 @@
         </p:blipFill>
         <p:spPr>
           <a:xfrm>
-            <a:off x="2908296" y="5153891"/>
-            <a:ext cx="3793841" cy="2143480"/>
+            <a:off x="2555004" y="4914899"/>
+            <a:ext cx="4323777" cy="2442888"/>
           </a:xfrm>
           <a:prstGeom prst="rect">
             <a:avLst/>
@@ -7487,6 +7723,139 @@
           <a:p>
             <a:r>
               <a:rPr lang="en-US" dirty="0" smtClean="0"/>
+              <a:t>Who needs phoenix eye?</a:t>
+            </a:r>
+            <a:endParaRPr lang="en-US" dirty="0"/>
+          </a:p>
+        </p:txBody>
+      </p:sp>
+      <p:sp>
+        <p:nvSpPr>
+          <p:cNvPr id="3" name="Content Placeholder 2"/>
+          <p:cNvSpPr>
+            <a:spLocks noGrp="1"/>
+          </p:cNvSpPr>
+          <p:nvPr>
+            <p:ph idx="1"/>
+          </p:nvPr>
+        </p:nvSpPr>
+        <p:spPr/>
+        <p:txBody>
+          <a:bodyPr>
+            <a:normAutofit/>
+          </a:bodyPr>
+          <a:lstStyle/>
+          <a:p>
+            <a:pPr algn="r"/>
+            <a:r>
+              <a:rPr lang="en-US" sz="3200" dirty="0" smtClean="0"/>
+              <a:t>Birders! </a:t>
+            </a:r>
+          </a:p>
+          <a:p>
+            <a:pPr algn="r"/>
+            <a:r>
+              <a:rPr lang="en-US" sz="3200" dirty="0" smtClean="0"/>
+              <a:t>Cornell Laboratory of Ornithology</a:t>
+            </a:r>
+          </a:p>
+          <a:p>
+            <a:pPr algn="r"/>
+            <a:r>
+              <a:rPr lang="en-US" sz="3200" dirty="0" smtClean="0"/>
+              <a:t>Biologists all over the world!</a:t>
+            </a:r>
+          </a:p>
+          <a:p>
+            <a:pPr algn="r"/>
+            <a:r>
+              <a:rPr lang="en-US" sz="3200" dirty="0" smtClean="0"/>
+              <a:t>Project designers</a:t>
+            </a:r>
+          </a:p>
+          <a:p>
+            <a:pPr algn="r"/>
+            <a:endParaRPr lang="en-US" sz="3200" dirty="0"/>
+          </a:p>
+        </p:txBody>
+      </p:sp>
+      <p:pic>
+        <p:nvPicPr>
+          <p:cNvPr id="4" name="Picture 3"/>
+          <p:cNvPicPr>
+            <a:picLocks noChangeAspect="1"/>
+          </p:cNvPicPr>
+          <p:nvPr/>
+        </p:nvPicPr>
+        <p:blipFill>
+          <a:blip r:embed="rId2" cstate="print">
+            <a:extLst>
+              <a:ext uri="{28A0092B-C50C-407E-A947-70E740481C1C}">
+                <a14:useLocalDpi xmlns:a14="http://schemas.microsoft.com/office/drawing/2010/main" val="0"/>
+              </a:ext>
+            </a:extLst>
+          </a:blip>
+          <a:stretch>
+            <a:fillRect/>
+          </a:stretch>
+        </p:blipFill>
+        <p:spPr>
+          <a:xfrm>
+            <a:off x="504031" y="4104409"/>
+            <a:ext cx="3082875" cy="2279318"/>
+          </a:xfrm>
+          <a:prstGeom prst="rect">
+            <a:avLst/>
+          </a:prstGeom>
+        </p:spPr>
+      </p:pic>
+    </p:spTree>
+    <p:extLst>
+      <p:ext uri="{BB962C8B-B14F-4D97-AF65-F5344CB8AC3E}">
+        <p14:creationId xmlns:p14="http://schemas.microsoft.com/office/powerpoint/2010/main" val="4083933456"/>
+      </p:ext>
+    </p:extLst>
+  </p:cSld>
+  <p:clrMapOvr>
+    <a:masterClrMapping/>
+  </p:clrMapOvr>
+</p:sld>
+</file>
+
+<file path=ppt/slides/slide8.xml><?xml version="1.0" encoding="utf-8"?>
+<p:sld xmlns:a="http://schemas.openxmlformats.org/drawingml/2006/main" xmlns:r="http://schemas.openxmlformats.org/officeDocument/2006/relationships" xmlns:p="http://schemas.openxmlformats.org/presentationml/2006/main">
+  <p:cSld>
+    <p:spTree>
+      <p:nvGrpSpPr>
+        <p:cNvPr id="1" name=""/>
+        <p:cNvGrpSpPr/>
+        <p:nvPr/>
+      </p:nvGrpSpPr>
+      <p:grpSpPr>
+        <a:xfrm>
+          <a:off x="0" y="0"/>
+          <a:ext cx="0" cy="0"/>
+          <a:chOff x="0" y="0"/>
+          <a:chExt cx="0" cy="0"/>
+        </a:xfrm>
+      </p:grpSpPr>
+      <p:sp>
+        <p:nvSpPr>
+          <p:cNvPr id="2" name="Title 1"/>
+          <p:cNvSpPr>
+            <a:spLocks noGrp="1"/>
+          </p:cNvSpPr>
+          <p:nvPr>
+            <p:ph type="title"/>
+          </p:nvPr>
+        </p:nvSpPr>
+        <p:spPr/>
+        <p:txBody>
+          <a:bodyPr/>
+          <a:lstStyle/>
+          <a:p>
+            <a:r>
+              <a:rPr lang="en-US" dirty="0" smtClean="0"/>
               <a:t>How it works</a:t>
             </a:r>
             <a:endParaRPr lang="en-US" dirty="0"/>
@@ -7629,125 +7998,6 @@
     <p:extLst>
       <p:ext uri="{BB962C8B-B14F-4D97-AF65-F5344CB8AC3E}">
         <p14:creationId xmlns:p14="http://schemas.microsoft.com/office/powerpoint/2010/main" val="1116334324"/>
-      </p:ext>
-    </p:extLst>
-  </p:cSld>
-  <p:clrMapOvr>
-    <a:masterClrMapping/>
-  </p:clrMapOvr>
-  <p:timing>
-    <p:tnLst>
-      <p:par>
-        <p:cTn id="1" dur="indefinite" restart="never" nodeType="tmRoot"/>
-      </p:par>
-    </p:tnLst>
-  </p:timing>
-</p:sld>
-</file>
-
-<file path=ppt/slides/slide8.xml><?xml version="1.0" encoding="utf-8"?>
-<p:sld xmlns:a="http://schemas.openxmlformats.org/drawingml/2006/main" xmlns:r="http://schemas.openxmlformats.org/officeDocument/2006/relationships" xmlns:p="http://schemas.openxmlformats.org/presentationml/2006/main">
-  <p:cSld>
-    <p:spTree>
-      <p:nvGrpSpPr>
-        <p:cNvPr id="1" name=""/>
-        <p:cNvGrpSpPr/>
-        <p:nvPr/>
-      </p:nvGrpSpPr>
-      <p:grpSpPr>
-        <a:xfrm>
-          <a:off x="0" y="0"/>
-          <a:ext cx="0" cy="0"/>
-          <a:chOff x="0" y="0"/>
-          <a:chExt cx="0" cy="0"/>
-        </a:xfrm>
-      </p:grpSpPr>
-      <p:sp>
-        <p:nvSpPr>
-          <p:cNvPr id="2" name="Title 1"/>
-          <p:cNvSpPr>
-            <a:spLocks noGrp="1"/>
-          </p:cNvSpPr>
-          <p:nvPr>
-            <p:ph type="title"/>
-          </p:nvPr>
-        </p:nvSpPr>
-        <p:spPr/>
-        <p:txBody>
-          <a:bodyPr/>
-          <a:lstStyle/>
-          <a:p>
-            <a:r>
-              <a:rPr lang="en-US" dirty="0" smtClean="0"/>
-              <a:t>Timeline for release</a:t>
-            </a:r>
-            <a:endParaRPr lang="en-US" dirty="0"/>
-          </a:p>
-        </p:txBody>
-      </p:sp>
-      <p:sp>
-        <p:nvSpPr>
-          <p:cNvPr id="3" name="Content Placeholder 2"/>
-          <p:cNvSpPr>
-            <a:spLocks noGrp="1"/>
-          </p:cNvSpPr>
-          <p:nvPr>
-            <p:ph idx="1"/>
-          </p:nvPr>
-        </p:nvSpPr>
-        <p:spPr>
-          <a:xfrm>
-            <a:off x="504031" y="1761849"/>
-            <a:ext cx="8568531" cy="4022493"/>
-          </a:xfrm>
-        </p:spPr>
-        <p:txBody>
-          <a:bodyPr>
-            <a:normAutofit/>
-          </a:bodyPr>
-          <a:lstStyle/>
-          <a:p>
-            <a:r>
-              <a:rPr lang="en-US" sz="2800" dirty="0" smtClean="0"/>
-              <a:t>Choose a </a:t>
-            </a:r>
-            <a:r>
-              <a:rPr lang="en-US" sz="2800" dirty="0" smtClean="0"/>
-              <a:t>technology: Android or mobile web based</a:t>
-            </a:r>
-            <a:endParaRPr lang="en-US" sz="2800" dirty="0" smtClean="0"/>
-          </a:p>
-          <a:p>
-            <a:r>
-              <a:rPr lang="en-US" sz="2800" dirty="0" smtClean="0"/>
-              <a:t>Declare initial features</a:t>
-            </a:r>
-          </a:p>
-          <a:p>
-            <a:r>
-              <a:rPr lang="en-US" sz="2800" dirty="0" smtClean="0"/>
-              <a:t>Establish test group</a:t>
-            </a:r>
-          </a:p>
-          <a:p>
-            <a:r>
-              <a:rPr lang="en-US" sz="2800" dirty="0" smtClean="0"/>
-              <a:t>Develop initial features</a:t>
-            </a:r>
-          </a:p>
-          <a:p>
-            <a:r>
-              <a:rPr lang="en-US" sz="2800" dirty="0" smtClean="0"/>
-              <a:t>Receive feedback for further development</a:t>
-            </a:r>
-            <a:endParaRPr lang="en-US" sz="2800" dirty="0"/>
-          </a:p>
-        </p:txBody>
-      </p:sp>
-    </p:spTree>
-    <p:extLst>
-      <p:ext uri="{BB962C8B-B14F-4D97-AF65-F5344CB8AC3E}">
-        <p14:creationId xmlns:p14="http://schemas.microsoft.com/office/powerpoint/2010/main" val="2293057192"/>
       </p:ext>
     </p:extLst>
   </p:cSld>
@@ -7791,19 +8041,14 @@
             <p:ph type="title"/>
           </p:nvPr>
         </p:nvSpPr>
-        <p:spPr>
-          <a:xfrm>
-            <a:off x="504031" y="671973"/>
-            <a:ext cx="8568531" cy="658063"/>
-          </a:xfrm>
-        </p:spPr>
+        <p:spPr/>
         <p:txBody>
           <a:bodyPr/>
           <a:lstStyle/>
           <a:p>
             <a:r>
               <a:rPr lang="en-US" dirty="0" smtClean="0"/>
-              <a:t>Citations</a:t>
+              <a:t>Timeline for release</a:t>
             </a:r>
             <a:endParaRPr lang="en-US" dirty="0"/>
           </a:p>
@@ -7821,8 +8066,8 @@
         </p:nvSpPr>
         <p:spPr>
           <a:xfrm>
-            <a:off x="504031" y="1330036"/>
-            <a:ext cx="8568531" cy="6858000"/>
+            <a:off x="504031" y="1761849"/>
+            <a:ext cx="8568531" cy="4022493"/>
           </a:xfrm>
         </p:spPr>
         <p:txBody>
@@ -7832,112 +8077,41 @@
           <a:lstStyle/>
           <a:p>
             <a:r>
-              <a:rPr lang="en-US" sz="2800" dirty="0" err="1"/>
-              <a:t>SciStarter</a:t>
-            </a:r>
-            <a:r>
-              <a:rPr lang="en-US" sz="2800" dirty="0"/>
-              <a:t>. (</a:t>
-            </a:r>
-            <a:r>
-              <a:rPr lang="en-US" sz="2800" dirty="0" err="1"/>
-              <a:t>n.d.</a:t>
-            </a:r>
-            <a:r>
-              <a:rPr lang="en-US" sz="2800" dirty="0"/>
-              <a:t>). Retrieved February 05, 2016, from http://scistarter.com/page/Citizen Science.html </a:t>
-            </a:r>
-          </a:p>
-          <a:p>
-            <a:r>
-              <a:rPr lang="en-US" sz="2800" dirty="0" smtClean="0">
-                <a:hlinkClick r:id="rId2"/>
-              </a:rPr>
-              <a:t>https</a:t>
-            </a:r>
-            <a:r>
-              <a:rPr lang="en-US" sz="2800" dirty="0">
-                <a:hlinkClick r:id="rId2"/>
-              </a:rPr>
-              <a:t>://</a:t>
-            </a:r>
-            <a:r>
-              <a:rPr lang="en-US" sz="2800" dirty="0" smtClean="0">
-                <a:hlinkClick r:id="rId2"/>
-              </a:rPr>
-              <a:t>upload.wikimedia.org/wikipedia/commons/2/2d/Birdwatchers_taking_a_closer_look_through_their_binoculars.jpg</a:t>
-            </a:r>
-            <a:endParaRPr lang="en-US" sz="2800" dirty="0" smtClean="0"/>
-          </a:p>
-          <a:p>
-            <a:r>
-              <a:rPr lang="en-US" sz="2800" dirty="0" smtClean="0">
-                <a:hlinkClick r:id="rId3"/>
-              </a:rPr>
-              <a:t>http://www.ebird.org</a:t>
-            </a:r>
-            <a:endParaRPr lang="en-US" sz="2800" dirty="0" smtClean="0"/>
-          </a:p>
-          <a:p>
-            <a:r>
-              <a:rPr lang="en-US" sz="2800" dirty="0" smtClean="0">
-                <a:hlinkClick r:id="rId4"/>
-              </a:rPr>
-              <a:t>http</a:t>
-            </a:r>
-            <a:r>
-              <a:rPr lang="en-US" sz="2800" dirty="0">
-                <a:hlinkClick r:id="rId4"/>
-              </a:rPr>
-              <a:t>://fold.it/portal</a:t>
-            </a:r>
-            <a:r>
-              <a:rPr lang="en-US" sz="2800" dirty="0" smtClean="0">
-                <a:hlinkClick r:id="rId4"/>
-              </a:rPr>
-              <a:t>/</a:t>
-            </a:r>
-            <a:endParaRPr lang="en-US" sz="2800" dirty="0" smtClean="0"/>
-          </a:p>
-          <a:p>
-            <a:r>
-              <a:rPr lang="en-US" sz="2800" dirty="0">
-                <a:hlinkClick r:id="rId5"/>
-              </a:rPr>
-              <a:t>http://</a:t>
-            </a:r>
-            <a:r>
-              <a:rPr lang="en-US" sz="2800" dirty="0" smtClean="0">
-                <a:hlinkClick r:id="rId5"/>
-              </a:rPr>
-              <a:t>www.pacificwhale.org/research/great-whale-count</a:t>
-            </a:r>
-            <a:endParaRPr lang="en-US" sz="2800" dirty="0" smtClean="0"/>
-          </a:p>
-          <a:p>
-            <a:endParaRPr lang="en-US" sz="2800" dirty="0" smtClean="0"/>
-          </a:p>
-          <a:p>
-            <a:endParaRPr lang="en-US" sz="2800" dirty="0" smtClean="0"/>
-          </a:p>
-          <a:p>
-            <a:endParaRPr lang="en-US" sz="2800" dirty="0" smtClean="0"/>
-          </a:p>
-          <a:p>
-            <a:pPr marL="0" indent="0">
-              <a:buNone/>
-            </a:pPr>
+              <a:rPr lang="en-US" sz="2800" dirty="0" smtClean="0"/>
+              <a:t>Choose a technology: Android or mobile web based</a:t>
+            </a:r>
+          </a:p>
+          <a:p>
+            <a:r>
+              <a:rPr lang="en-US" sz="2800" dirty="0" smtClean="0"/>
+              <a:t>Declare initial features</a:t>
+            </a:r>
+          </a:p>
+          <a:p>
+            <a:r>
+              <a:rPr lang="en-US" sz="2800" dirty="0" smtClean="0"/>
+              <a:t>Establish test group</a:t>
+            </a:r>
+          </a:p>
+          <a:p>
+            <a:r>
+              <a:rPr lang="en-US" sz="2800" dirty="0" smtClean="0"/>
+              <a:t>Develop initial features</a:t>
+            </a:r>
+          </a:p>
+          <a:p>
+            <a:r>
+              <a:rPr lang="en-US" sz="2800" dirty="0" smtClean="0"/>
+              <a:t>Receive feedback for further development</a:t>
+            </a:r>
             <a:endParaRPr lang="en-US" sz="2800" dirty="0"/>
-          </a:p>
-          <a:p>
-            <a:endParaRPr lang="en-US" dirty="0"/>
           </a:p>
         </p:txBody>
       </p:sp>
     </p:spTree>
     <p:extLst>
       <p:ext uri="{BB962C8B-B14F-4D97-AF65-F5344CB8AC3E}">
-        <p14:creationId xmlns:p14="http://schemas.microsoft.com/office/powerpoint/2010/main" val="255573761"/>
+        <p14:creationId xmlns:p14="http://schemas.microsoft.com/office/powerpoint/2010/main" val="2293057192"/>
       </p:ext>
     </p:extLst>
   </p:cSld>

</xml_diff>

<commit_message>
Final presentation (unless something changes in the morning.)
</commit_message>
<xml_diff>
--- a/Resource/Bio_Presentation.pptx
+++ b/Resource/Bio_Presentation.pptx
@@ -9,10 +9,10 @@
   </p:notesMasterIdLst>
   <p:sldIdLst>
     <p:sldId id="264" r:id="rId2"/>
-    <p:sldId id="266" r:id="rId3"/>
-    <p:sldId id="267" r:id="rId4"/>
-    <p:sldId id="269" r:id="rId5"/>
-    <p:sldId id="259" r:id="rId6"/>
+    <p:sldId id="259" r:id="rId3"/>
+    <p:sldId id="266" r:id="rId4"/>
+    <p:sldId id="267" r:id="rId5"/>
+    <p:sldId id="269" r:id="rId6"/>
     <p:sldId id="268" r:id="rId7"/>
     <p:sldId id="272" r:id="rId8"/>
     <p:sldId id="270" r:id="rId9"/>
@@ -518,6 +518,90 @@
           <a:bodyPr/>
           <a:lstStyle/>
           <a:p>
+            <a:endParaRPr lang="en-US" dirty="0"/>
+          </a:p>
+        </p:txBody>
+      </p:sp>
+      <p:sp>
+        <p:nvSpPr>
+          <p:cNvPr id="4" name="Slide Number Placeholder 3"/>
+          <p:cNvSpPr>
+            <a:spLocks noGrp="1"/>
+          </p:cNvSpPr>
+          <p:nvPr>
+            <p:ph type="sldNum" sz="quarter" idx="10"/>
+          </p:nvPr>
+        </p:nvSpPr>
+        <p:spPr/>
+        <p:txBody>
+          <a:bodyPr/>
+          <a:lstStyle/>
+          <a:p>
+            <a:fld id="{FD0B2983-9D79-45F6-90B4-CB9788BD9E3C}" type="slidenum">
+              <a:rPr lang="en-US" smtClean="0"/>
+              <a:t>4</a:t>
+            </a:fld>
+            <a:endParaRPr lang="en-US"/>
+          </a:p>
+        </p:txBody>
+      </p:sp>
+    </p:spTree>
+    <p:extLst>
+      <p:ext uri="{BB962C8B-B14F-4D97-AF65-F5344CB8AC3E}">
+        <p14:creationId xmlns:p14="http://schemas.microsoft.com/office/powerpoint/2010/main" val="33870663"/>
+      </p:ext>
+    </p:extLst>
+  </p:cSld>
+  <p:clrMapOvr>
+    <a:masterClrMapping/>
+  </p:clrMapOvr>
+</p:notes>
+</file>
+
+<file path=ppt/notesSlides/notesSlide2.xml><?xml version="1.0" encoding="utf-8"?>
+<p:notes xmlns:a="http://schemas.openxmlformats.org/drawingml/2006/main" xmlns:r="http://schemas.openxmlformats.org/officeDocument/2006/relationships" xmlns:p="http://schemas.openxmlformats.org/presentationml/2006/main">
+  <p:cSld>
+    <p:spTree>
+      <p:nvGrpSpPr>
+        <p:cNvPr id="1" name=""/>
+        <p:cNvGrpSpPr/>
+        <p:nvPr/>
+      </p:nvGrpSpPr>
+      <p:grpSpPr>
+        <a:xfrm>
+          <a:off x="0" y="0"/>
+          <a:ext cx="0" cy="0"/>
+          <a:chOff x="0" y="0"/>
+          <a:chExt cx="0" cy="0"/>
+        </a:xfrm>
+      </p:grpSpPr>
+      <p:sp>
+        <p:nvSpPr>
+          <p:cNvPr id="2" name="Slide Image Placeholder 1"/>
+          <p:cNvSpPr>
+            <a:spLocks noGrp="1" noRot="1" noChangeAspect="1"/>
+          </p:cNvSpPr>
+          <p:nvPr>
+            <p:ph type="sldImg"/>
+          </p:nvPr>
+        </p:nvSpPr>
+        <p:spPr/>
+      </p:sp>
+      <p:sp>
+        <p:nvSpPr>
+          <p:cNvPr id="3" name="Notes Placeholder 2"/>
+          <p:cNvSpPr>
+            <a:spLocks noGrp="1"/>
+          </p:cNvSpPr>
+          <p:nvPr>
+            <p:ph type="body" idx="1"/>
+          </p:nvPr>
+        </p:nvSpPr>
+        <p:spPr/>
+        <p:txBody>
+          <a:bodyPr/>
+          <a:lstStyle/>
+          <a:p>
             <a:r>
               <a:rPr lang="en-US" dirty="0" smtClean="0"/>
               <a:t>Needs to</a:t>
@@ -547,7 +631,7 @@
           <a:p>
             <a:fld id="{FD0B2983-9D79-45F6-90B4-CB9788BD9E3C}" type="slidenum">
               <a:rPr lang="en-US" smtClean="0"/>
-              <a:t>4</a:t>
+              <a:t>5</a:t>
             </a:fld>
             <a:endParaRPr lang="en-US"/>
           </a:p>
@@ -557,6 +641,98 @@
     <p:extLst>
       <p:ext uri="{BB962C8B-B14F-4D97-AF65-F5344CB8AC3E}">
         <p14:creationId xmlns:p14="http://schemas.microsoft.com/office/powerpoint/2010/main" val="419194748"/>
+      </p:ext>
+    </p:extLst>
+  </p:cSld>
+  <p:clrMapOvr>
+    <a:masterClrMapping/>
+  </p:clrMapOvr>
+</p:notes>
+</file>
+
+<file path=ppt/notesSlides/notesSlide3.xml><?xml version="1.0" encoding="utf-8"?>
+<p:notes xmlns:a="http://schemas.openxmlformats.org/drawingml/2006/main" xmlns:r="http://schemas.openxmlformats.org/officeDocument/2006/relationships" xmlns:p="http://schemas.openxmlformats.org/presentationml/2006/main">
+  <p:cSld>
+    <p:spTree>
+      <p:nvGrpSpPr>
+        <p:cNvPr id="1" name=""/>
+        <p:cNvGrpSpPr/>
+        <p:nvPr/>
+      </p:nvGrpSpPr>
+      <p:grpSpPr>
+        <a:xfrm>
+          <a:off x="0" y="0"/>
+          <a:ext cx="0" cy="0"/>
+          <a:chOff x="0" y="0"/>
+          <a:chExt cx="0" cy="0"/>
+        </a:xfrm>
+      </p:grpSpPr>
+      <p:sp>
+        <p:nvSpPr>
+          <p:cNvPr id="2" name="Slide Image Placeholder 1"/>
+          <p:cNvSpPr>
+            <a:spLocks noGrp="1" noRot="1" noChangeAspect="1"/>
+          </p:cNvSpPr>
+          <p:nvPr>
+            <p:ph type="sldImg"/>
+          </p:nvPr>
+        </p:nvSpPr>
+        <p:spPr/>
+      </p:sp>
+      <p:sp>
+        <p:nvSpPr>
+          <p:cNvPr id="3" name="Notes Placeholder 2"/>
+          <p:cNvSpPr>
+            <a:spLocks noGrp="1"/>
+          </p:cNvSpPr>
+          <p:nvPr>
+            <p:ph type="body" idx="1"/>
+          </p:nvPr>
+        </p:nvSpPr>
+        <p:spPr/>
+        <p:txBody>
+          <a:bodyPr/>
+          <a:lstStyle/>
+          <a:p>
+            <a:r>
+              <a:rPr lang="en-US" dirty="0" err="1" smtClean="0"/>
+              <a:t>Iphone</a:t>
+            </a:r>
+            <a:r>
+              <a:rPr lang="en-US" dirty="0" smtClean="0"/>
+              <a:t> will follow</a:t>
+            </a:r>
+            <a:endParaRPr lang="en-US" dirty="0"/>
+          </a:p>
+        </p:txBody>
+      </p:sp>
+      <p:sp>
+        <p:nvSpPr>
+          <p:cNvPr id="4" name="Slide Number Placeholder 3"/>
+          <p:cNvSpPr>
+            <a:spLocks noGrp="1"/>
+          </p:cNvSpPr>
+          <p:nvPr>
+            <p:ph type="sldNum" sz="quarter" idx="10"/>
+          </p:nvPr>
+        </p:nvSpPr>
+        <p:spPr/>
+        <p:txBody>
+          <a:bodyPr/>
+          <a:lstStyle/>
+          <a:p>
+            <a:fld id="{FD0B2983-9D79-45F6-90B4-CB9788BD9E3C}" type="slidenum">
+              <a:rPr lang="en-US" smtClean="0"/>
+              <a:t>9</a:t>
+            </a:fld>
+            <a:endParaRPr lang="en-US"/>
+          </a:p>
+        </p:txBody>
+      </p:sp>
+    </p:spTree>
+    <p:extLst>
+      <p:ext uri="{BB962C8B-B14F-4D97-AF65-F5344CB8AC3E}">
+        <p14:creationId xmlns:p14="http://schemas.microsoft.com/office/powerpoint/2010/main" val="1043187185"/>
       </p:ext>
     </p:extLst>
   </p:cSld>
@@ -6568,12 +6744,12 @@
           <a:lstStyle/>
           <a:p>
             <a:r>
-              <a:rPr lang="en-US" sz="3600" dirty="0" smtClean="0">
+              <a:rPr lang="en-US" sz="4800" dirty="0" smtClean="0">
                 <a:latin typeface="Arial"/>
               </a:rPr>
               <a:t>Phoenix eye</a:t>
             </a:r>
-            <a:endParaRPr lang="en-US" sz="3600" dirty="0"/>
+            <a:endParaRPr lang="en-US" sz="4800" dirty="0"/>
           </a:p>
         </p:txBody>
       </p:sp>
@@ -6594,26 +6770,24 @@
           </a:xfrm>
         </p:spPr>
         <p:txBody>
-          <a:bodyPr/>
-          <a:lstStyle/>
-          <a:p>
-            <a:r>
-              <a:rPr lang="en-US" sz="2800" dirty="0" smtClean="0"/>
-              <a:t>By</a:t>
-            </a:r>
-            <a:r>
-              <a:rPr lang="en-US" dirty="0" smtClean="0"/>
-              <a:t> Brandon </a:t>
-            </a:r>
-            <a:r>
-              <a:rPr lang="en-US" dirty="0" err="1" smtClean="0"/>
+          <a:bodyPr>
+            <a:normAutofit/>
+          </a:bodyPr>
+          <a:lstStyle/>
+          <a:p>
+            <a:r>
+              <a:rPr lang="en-US" sz="2400" dirty="0" smtClean="0"/>
+              <a:t>By Brandon </a:t>
+            </a:r>
+            <a:r>
+              <a:rPr lang="en-US" sz="2400" dirty="0" err="1" smtClean="0"/>
               <a:t>hoyt</a:t>
             </a:r>
             <a:r>
-              <a:rPr lang="en-US" dirty="0" smtClean="0"/>
+              <a:rPr lang="en-US" sz="2400" dirty="0" smtClean="0"/>
               <a:t> and Wesley varughese</a:t>
             </a:r>
-            <a:endParaRPr lang="en-US" dirty="0"/>
+            <a:endParaRPr lang="en-US" sz="2400" dirty="0"/>
           </a:p>
         </p:txBody>
       </p:sp>
@@ -6626,7 +6800,7 @@
         <p:spPr>
           <a:xfrm>
             <a:off x="4551218" y="4686300"/>
-            <a:ext cx="4655127" cy="646331"/>
+            <a:ext cx="4655127" cy="830997"/>
           </a:xfrm>
           <a:prstGeom prst="rect">
             <a:avLst/>
@@ -6640,24 +6814,24 @@
           <a:lstStyle/>
           <a:p>
             <a:r>
-              <a:rPr lang="en-US" dirty="0" smtClean="0"/>
+              <a:rPr lang="en-US" sz="2400" dirty="0" smtClean="0"/>
               <a:t>Florida Poly University Spring 2016</a:t>
             </a:r>
           </a:p>
           <a:p>
             <a:r>
-              <a:rPr lang="en-US" dirty="0" smtClean="0"/>
+              <a:rPr lang="en-US" sz="2400" dirty="0" smtClean="0"/>
               <a:t>Dr. </a:t>
             </a:r>
             <a:r>
-              <a:rPr lang="en-US" dirty="0" err="1" smtClean="0"/>
-              <a:t>Shareef</a:t>
-            </a:r>
-            <a:r>
-              <a:rPr lang="en-US" dirty="0" smtClean="0"/>
-              <a:t> Rashad  Project Advisor</a:t>
-            </a:r>
-            <a:endParaRPr lang="en-US" dirty="0"/>
+              <a:rPr lang="en-US" sz="2400" dirty="0" err="1" smtClean="0"/>
+              <a:t>Sherif</a:t>
+            </a:r>
+            <a:r>
+              <a:rPr lang="en-US" sz="2400" dirty="0" smtClean="0"/>
+              <a:t> Rashad -Project Advisor</a:t>
+            </a:r>
+            <a:endParaRPr lang="en-US" sz="2400" dirty="0"/>
           </a:p>
         </p:txBody>
       </p:sp>
@@ -6710,19 +6884,21 @@
         </p:nvSpPr>
         <p:spPr>
           <a:xfrm>
-            <a:off x="504031" y="671973"/>
+            <a:off x="504031" y="956787"/>
             <a:ext cx="8568531" cy="658063"/>
           </a:xfrm>
         </p:spPr>
         <p:txBody>
-          <a:bodyPr/>
-          <a:lstStyle/>
-          <a:p>
-            <a:r>
-              <a:rPr lang="en-US" dirty="0" smtClean="0"/>
+          <a:bodyPr>
+            <a:noAutofit/>
+          </a:bodyPr>
+          <a:lstStyle/>
+          <a:p>
+            <a:r>
+              <a:rPr lang="en-US" sz="4800" dirty="0" smtClean="0"/>
               <a:t>Citations</a:t>
             </a:r>
-            <a:endParaRPr lang="en-US" dirty="0"/>
+            <a:endParaRPr lang="en-US" sz="4800" dirty="0"/>
           </a:p>
         </p:txBody>
       </p:sp>
@@ -6744,7 +6920,7 @@
         </p:spPr>
         <p:txBody>
           <a:bodyPr>
-            <a:normAutofit fontScale="92500" lnSpcReduction="20000"/>
+            <a:normAutofit fontScale="85000" lnSpcReduction="10000"/>
           </a:bodyPr>
           <a:lstStyle/>
           <a:p>
@@ -6767,105 +6943,51 @@
           </a:p>
           <a:p>
             <a:r>
-              <a:rPr lang="en-US" sz="2800" dirty="0" smtClean="0">
-                <a:hlinkClick r:id="rId2"/>
-              </a:rPr>
-              <a:t>https</a:t>
-            </a:r>
-            <a:r>
-              <a:rPr lang="en-US" sz="2800" dirty="0">
-                <a:hlinkClick r:id="rId2"/>
-              </a:rPr>
-              <a:t>://</a:t>
-            </a:r>
-            <a:r>
-              <a:rPr lang="en-US" sz="2800" dirty="0" smtClean="0">
-                <a:hlinkClick r:id="rId2"/>
-              </a:rPr>
-              <a:t>upload.wikimedia.org/wikipedia/commons/2/2d/Birdwatchers_taking_a_closer_look_through_their_binoculars.jpg</a:t>
-            </a:r>
-            <a:endParaRPr lang="en-US" sz="2800" dirty="0" smtClean="0"/>
-          </a:p>
-          <a:p>
-            <a:r>
-              <a:rPr lang="en-US" sz="2800" dirty="0" smtClean="0">
-                <a:hlinkClick r:id="rId3"/>
-              </a:rPr>
-              <a:t>http://www.ebird.org</a:t>
-            </a:r>
-            <a:endParaRPr lang="en-US" sz="2800" dirty="0" smtClean="0"/>
-          </a:p>
-          <a:p>
-            <a:r>
-              <a:rPr lang="en-US" sz="2800" dirty="0" smtClean="0">
-                <a:hlinkClick r:id="rId4"/>
-              </a:rPr>
-              <a:t>http</a:t>
-            </a:r>
-            <a:r>
-              <a:rPr lang="en-US" sz="2800" dirty="0">
-                <a:hlinkClick r:id="rId4"/>
-              </a:rPr>
-              <a:t>://fold.it/portal</a:t>
-            </a:r>
-            <a:r>
-              <a:rPr lang="en-US" sz="2800" dirty="0" smtClean="0">
-                <a:hlinkClick r:id="rId4"/>
-              </a:rPr>
-              <a:t>/</a:t>
-            </a:r>
-            <a:endParaRPr lang="en-US" sz="2800" dirty="0" smtClean="0"/>
-          </a:p>
-          <a:p>
-            <a:r>
-              <a:rPr lang="en-US" sz="2800" dirty="0">
-                <a:hlinkClick r:id="rId5"/>
-              </a:rPr>
-              <a:t>http://</a:t>
-            </a:r>
-            <a:r>
-              <a:rPr lang="en-US" sz="2800" dirty="0" smtClean="0">
-                <a:hlinkClick r:id="rId5"/>
-              </a:rPr>
-              <a:t>www.pacificwhale.org/research/great-whale-count</a:t>
-            </a:r>
-            <a:endParaRPr lang="en-US" sz="2800" dirty="0" smtClean="0"/>
-          </a:p>
-          <a:p>
-            <a:r>
-              <a:rPr lang="en-US" sz="2800" dirty="0">
-                <a:hlinkClick r:id="rId6"/>
-              </a:rPr>
-              <a:t>http://</a:t>
-            </a:r>
-            <a:r>
-              <a:rPr lang="en-US" sz="2800" dirty="0" smtClean="0">
-                <a:hlinkClick r:id="rId6"/>
-              </a:rPr>
-              <a:t>blog.aba.org/2011/12/ebird-changed-my-life.html</a:t>
-            </a:r>
-            <a:endParaRPr lang="en-US" sz="2800" dirty="0" smtClean="0"/>
-          </a:p>
-          <a:p>
-            <a:r>
-              <a:rPr lang="en-US" sz="2800">
-                <a:hlinkClick r:id="rId7"/>
-              </a:rPr>
-              <a:t>http://</a:t>
-            </a:r>
-            <a:r>
-              <a:rPr lang="en-US" sz="2800">
-                <a:hlinkClick r:id="rId7"/>
-              </a:rPr>
-              <a:t>ebird.org/content/ebird/news/lasortemap</a:t>
-            </a:r>
-            <a:r>
-              <a:rPr lang="en-US" sz="2800" smtClean="0">
-                <a:hlinkClick r:id="rId7"/>
-              </a:rPr>
-              <a:t>/</a:t>
-            </a:r>
-            <a:endParaRPr lang="en-US" sz="2800" smtClean="0"/>
+              <a:rPr lang="en-US" sz="2800" dirty="0"/>
+              <a:t> News and Features. (</a:t>
+            </a:r>
+            <a:r>
+              <a:rPr lang="en-US" sz="2800" dirty="0" err="1"/>
+              <a:t>n.d.</a:t>
+            </a:r>
+            <a:r>
+              <a:rPr lang="en-US" sz="2800" dirty="0"/>
+              <a:t>). Retrieved February 13, 2016, from http://www.ebird.org/ </a:t>
+            </a:r>
+          </a:p>
+          <a:p>
+            <a:r>
+              <a:rPr lang="en-US" sz="2800" dirty="0"/>
+              <a:t> Great Whale Count. (</a:t>
+            </a:r>
+            <a:r>
+              <a:rPr lang="en-US" sz="2800" dirty="0" err="1"/>
+              <a:t>n.d.</a:t>
+            </a:r>
+            <a:r>
+              <a:rPr lang="en-US" sz="2800" dirty="0"/>
+              <a:t>). Retrieved February 13, 2016, from http://www.pacificwhale.org/research/great-whale-count </a:t>
+            </a:r>
+          </a:p>
+          <a:p>
+            <a:r>
+              <a:rPr lang="en-US" sz="2800" dirty="0"/>
+              <a:t> Solve Puzzles for Science | Foldit. (</a:t>
+            </a:r>
+            <a:r>
+              <a:rPr lang="en-US" sz="2800" dirty="0" err="1"/>
+              <a:t>n.d.</a:t>
+            </a:r>
+            <a:r>
+              <a:rPr lang="en-US" sz="2800" dirty="0"/>
+              <a:t>). Retrieved February 13, 2016, from http://fold.it/portal/ </a:t>
+            </a:r>
+          </a:p>
+          <a:p>
+            <a:r>
+              <a:rPr lang="en-US" sz="2800" dirty="0"/>
+              <a:t>https://upload.wikimedia.org/wikipedia/commons/2/2d/Birdwatchers_taking_a_closer_look_through_their_binoculars.jpg</a:t>
+            </a:r>
           </a:p>
           <a:p>
             <a:pPr marL="0" indent="0">
@@ -6935,78 +7057,137 @@
       </p:grpSpPr>
       <p:sp>
         <p:nvSpPr>
-          <p:cNvPr id="2" name="Title 1"/>
-          <p:cNvSpPr>
-            <a:spLocks noGrp="1"/>
-          </p:cNvSpPr>
-          <p:nvPr>
-            <p:ph type="title"/>
-          </p:nvPr>
-        </p:nvSpPr>
-        <p:spPr/>
-        <p:txBody>
-          <a:bodyPr/>
-          <a:lstStyle/>
-          <a:p>
-            <a:r>
-              <a:rPr lang="en-US" dirty="0" smtClean="0"/>
-              <a:t>Objectives</a:t>
-            </a:r>
-            <a:endParaRPr lang="en-US" dirty="0"/>
-          </a:p>
-        </p:txBody>
-      </p:sp>
-      <p:sp>
-        <p:nvSpPr>
-          <p:cNvPr id="8" name="Content Placeholder 7"/>
-          <p:cNvSpPr>
-            <a:spLocks noGrp="1"/>
-          </p:cNvSpPr>
-          <p:nvPr>
-            <p:ph idx="1"/>
-          </p:nvPr>
+          <p:cNvPr id="48" name="TextShape 1"/>
+          <p:cNvSpPr txBox="1"/>
+          <p:nvPr/>
         </p:nvSpPr>
         <p:spPr>
           <a:xfrm>
-            <a:off x="504030" y="1321574"/>
-            <a:ext cx="8568531" cy="4022493"/>
-          </a:xfrm>
-        </p:spPr>
-        <p:txBody>
-          <a:bodyPr/>
-          <a:lstStyle/>
-          <a:p>
-            <a:r>
-              <a:rPr lang="en-US" sz="2800" dirty="0" smtClean="0"/>
-              <a:t>Use citizen science to understand bird life</a:t>
-            </a:r>
-          </a:p>
-          <a:p>
-            <a:r>
-              <a:rPr lang="en-US" sz="2800" dirty="0" smtClean="0"/>
-              <a:t>Create a social media application for eBird</a:t>
-            </a:r>
-          </a:p>
-          <a:p>
-            <a:pPr marL="0" indent="0">
-              <a:buNone/>
-            </a:pPr>
-            <a:endParaRPr lang="en-US" dirty="0" smtClean="0"/>
-          </a:p>
-          <a:p>
-            <a:pPr marL="0" indent="0">
-              <a:buNone/>
-            </a:pPr>
-            <a:endParaRPr lang="en-US" dirty="0"/>
+            <a:off x="504000" y="301320"/>
+            <a:ext cx="9071640" cy="5851800"/>
+          </a:xfrm>
+          <a:prstGeom prst="rect">
+            <a:avLst/>
+          </a:prstGeom>
+          <a:noFill/>
+          <a:ln>
+            <a:noFill/>
+          </a:ln>
+        </p:spPr>
+        <p:txBody>
+          <a:bodyPr lIns="0" tIns="0" rIns="0" bIns="0" anchor="ctr"/>
+          <a:lstStyle/>
+          <a:p>
+            <a:pPr algn="ctr"/>
+            <a:r>
+              <a:rPr lang="en-US" sz="3200" dirty="0">
+                <a:latin typeface="Arial"/>
+              </a:rPr>
+              <a:t>Presenting: Phoenix Eye</a:t>
+            </a:r>
+            <a:endParaRPr dirty="0"/>
+          </a:p>
+          <a:p>
+            <a:pPr algn="ctr"/>
+            <a:r>
+              <a:rPr lang="en-US" sz="3200" dirty="0">
+                <a:latin typeface="Arial"/>
+              </a:rPr>
+              <a:t>Need a logo/graphic here.</a:t>
+            </a:r>
+            <a:endParaRPr dirty="0"/>
+          </a:p>
+        </p:txBody>
+      </p:sp>
+      <p:pic>
+        <p:nvPicPr>
+          <p:cNvPr id="3" name="Picture 2"/>
+          <p:cNvPicPr>
+            <a:picLocks noChangeAspect="1"/>
+          </p:cNvPicPr>
+          <p:nvPr/>
+        </p:nvPicPr>
+        <p:blipFill>
+          <a:blip r:embed="rId2" cstate="print">
+            <a:extLst>
+              <a:ext uri="{28A0092B-C50C-407E-A947-70E740481C1C}">
+                <a14:useLocalDpi xmlns:a14="http://schemas.microsoft.com/office/drawing/2010/main" val="0"/>
+              </a:ext>
+            </a:extLst>
+          </a:blip>
+          <a:stretch>
+            <a:fillRect/>
+          </a:stretch>
+        </p:blipFill>
+        <p:spPr>
+          <a:xfrm>
+            <a:off x="22225" y="1844799"/>
+            <a:ext cx="10058400" cy="5412340"/>
+          </a:xfrm>
+          <a:prstGeom prst="rect">
+            <a:avLst/>
+          </a:prstGeom>
+        </p:spPr>
+      </p:pic>
+      <p:sp>
+        <p:nvSpPr>
+          <p:cNvPr id="2" name="Rectangle 1"/>
+          <p:cNvSpPr/>
+          <p:nvPr/>
+        </p:nvSpPr>
+        <p:spPr>
+          <a:xfrm>
+            <a:off x="1375575" y="301320"/>
+            <a:ext cx="6802070" cy="1543479"/>
+          </a:xfrm>
+          <a:prstGeom prst="rect">
+            <a:avLst/>
+          </a:prstGeom>
+          <a:noFill/>
+        </p:spPr>
+        <p:txBody>
+          <a:bodyPr wrap="square" lIns="91440" tIns="45720" rIns="91440" bIns="45720">
+            <a:prstTxWarp prst="textInflateTop">
+              <a:avLst/>
+            </a:prstTxWarp>
+            <a:spAutoFit/>
+          </a:bodyPr>
+          <a:lstStyle/>
+          <a:p>
+            <a:pPr algn="ctr"/>
+            <a:r>
+              <a:rPr lang="en-US" sz="5400" b="0" cap="none" spc="0" dirty="0" smtClean="0">
+                <a:ln w="0"/>
+                <a:solidFill>
+                  <a:schemeClr val="tx1"/>
+                </a:solidFill>
+                <a:effectLst>
+                  <a:outerShdw blurRad="38100" dist="19050" dir="2700000" algn="tl" rotWithShape="0">
+                    <a:schemeClr val="dk1">
+                      <a:alpha val="40000"/>
+                    </a:schemeClr>
+                  </a:outerShdw>
+                </a:effectLst>
+              </a:rPr>
+              <a:t>Phoenix Eye</a:t>
+            </a:r>
+            <a:endParaRPr lang="en-US" sz="5400" b="0" cap="none" spc="0" dirty="0">
+              <a:ln w="0"/>
+              <a:solidFill>
+                <a:schemeClr val="tx1"/>
+              </a:solidFill>
+              <a:effectLst>
+                <a:outerShdw blurRad="38100" dist="19050" dir="2700000" algn="tl" rotWithShape="0">
+                  <a:schemeClr val="dk1">
+                    <a:alpha val="40000"/>
+                  </a:schemeClr>
+                </a:outerShdw>
+              </a:effectLst>
+            </a:endParaRPr>
           </a:p>
         </p:txBody>
       </p:sp>
     </p:spTree>
-    <p:extLst>
-      <p:ext uri="{BB962C8B-B14F-4D97-AF65-F5344CB8AC3E}">
-        <p14:creationId xmlns:p14="http://schemas.microsoft.com/office/powerpoint/2010/main" val="3835696038"/>
-      </p:ext>
-    </p:extLst>
   </p:cSld>
   <p:clrMapOvr>
     <a:masterClrMapping/>
@@ -7050,114 +7231,68 @@
         </p:nvSpPr>
         <p:spPr/>
         <p:txBody>
+          <a:bodyPr>
+            <a:normAutofit/>
+          </a:bodyPr>
+          <a:lstStyle/>
+          <a:p>
+            <a:r>
+              <a:rPr lang="en-US" sz="4800" dirty="0" smtClean="0"/>
+              <a:t>Objectives</a:t>
+            </a:r>
+            <a:endParaRPr lang="en-US" sz="4800" dirty="0"/>
+          </a:p>
+        </p:txBody>
+      </p:sp>
+      <p:sp>
+        <p:nvSpPr>
+          <p:cNvPr id="8" name="Content Placeholder 7"/>
+          <p:cNvSpPr>
+            <a:spLocks noGrp="1"/>
+          </p:cNvSpPr>
+          <p:nvPr>
+            <p:ph idx="1"/>
+          </p:nvPr>
+        </p:nvSpPr>
+        <p:spPr>
+          <a:xfrm>
+            <a:off x="504031" y="2026112"/>
+            <a:ext cx="8568531" cy="4022493"/>
+          </a:xfrm>
+        </p:spPr>
+        <p:txBody>
           <a:bodyPr/>
           <a:lstStyle/>
           <a:p>
             <a:r>
-              <a:rPr lang="en-US" dirty="0" smtClean="0"/>
-              <a:t>what is citizen science?</a:t>
-            </a:r>
+              <a:rPr lang="en-US" sz="3500" dirty="0" smtClean="0"/>
+              <a:t>Use citizen science to understand bird life</a:t>
+            </a:r>
+          </a:p>
+          <a:p>
+            <a:r>
+              <a:rPr lang="en-US" sz="3500" dirty="0" smtClean="0"/>
+              <a:t>Create a social media application for eBird</a:t>
+            </a:r>
+          </a:p>
+          <a:p>
+            <a:pPr marL="0" indent="0">
+              <a:buNone/>
+            </a:pPr>
+            <a:endParaRPr lang="en-US" dirty="0" smtClean="0"/>
+          </a:p>
+          <a:p>
+            <a:pPr marL="0" indent="0">
+              <a:buNone/>
+            </a:pPr>
             <a:endParaRPr lang="en-US" dirty="0"/>
           </a:p>
         </p:txBody>
       </p:sp>
-      <p:sp>
-        <p:nvSpPr>
-          <p:cNvPr id="3" name="Content Placeholder 2"/>
-          <p:cNvSpPr>
-            <a:spLocks noGrp="1"/>
-          </p:cNvSpPr>
-          <p:nvPr>
-            <p:ph idx="1"/>
-          </p:nvPr>
-        </p:nvSpPr>
-        <p:spPr/>
-        <p:txBody>
-          <a:bodyPr/>
-          <a:lstStyle/>
-          <a:p>
-            <a:r>
-              <a:rPr lang="en-US" sz="2800" dirty="0"/>
-              <a:t>The public involvement in inquiry and discovery of new scientific </a:t>
-            </a:r>
-            <a:r>
-              <a:rPr lang="en-US" sz="2800" dirty="0" smtClean="0"/>
-              <a:t>knowledge</a:t>
-            </a:r>
-          </a:p>
-          <a:p>
-            <a:r>
-              <a:rPr lang="en-US" sz="2800" dirty="0" smtClean="0"/>
-              <a:t>Examples-</a:t>
-            </a:r>
-          </a:p>
-          <a:p>
-            <a:pPr marL="0" indent="0">
-              <a:buNone/>
-            </a:pPr>
-            <a:r>
-              <a:rPr lang="en-US" sz="2800" dirty="0" smtClean="0"/>
-              <a:t>      -Foldit Void Crushers</a:t>
-            </a:r>
-          </a:p>
-          <a:p>
-            <a:pPr marL="0" indent="0">
-              <a:buNone/>
-            </a:pPr>
-            <a:r>
-              <a:rPr lang="en-US" sz="2800" dirty="0" smtClean="0"/>
-              <a:t>      -Great Whale Count</a:t>
-            </a:r>
-          </a:p>
-          <a:p>
-            <a:pPr marL="0" indent="0">
-              <a:buNone/>
-            </a:pPr>
-            <a:r>
-              <a:rPr lang="en-US" sz="2800" dirty="0" smtClean="0"/>
-              <a:t>     -eBird</a:t>
-            </a:r>
-            <a:endParaRPr lang="en-US" sz="2800" dirty="0"/>
-          </a:p>
-          <a:p>
-            <a:endParaRPr lang="en-US" dirty="0"/>
-          </a:p>
-        </p:txBody>
-      </p:sp>
-      <p:pic>
-        <p:nvPicPr>
-          <p:cNvPr id="4" name="Picture 3"/>
-          <p:cNvPicPr>
-            <a:picLocks noChangeAspect="1"/>
-          </p:cNvPicPr>
-          <p:nvPr/>
-        </p:nvPicPr>
-        <p:blipFill>
-          <a:blip r:embed="rId2">
-            <a:extLst>
-              <a:ext uri="{28A0092B-C50C-407E-A947-70E740481C1C}">
-                <a14:useLocalDpi xmlns:a14="http://schemas.microsoft.com/office/drawing/2010/main" val="0"/>
-              </a:ext>
-            </a:extLst>
-          </a:blip>
-          <a:stretch>
-            <a:fillRect/>
-          </a:stretch>
-        </p:blipFill>
-        <p:spPr>
-          <a:xfrm>
-            <a:off x="6556663" y="3085218"/>
-            <a:ext cx="3154255" cy="2113002"/>
-          </a:xfrm>
-          <a:prstGeom prst="rect">
-            <a:avLst/>
-          </a:prstGeom>
-        </p:spPr>
-      </p:pic>
     </p:spTree>
     <p:extLst>
       <p:ext uri="{BB962C8B-B14F-4D97-AF65-F5344CB8AC3E}">
-        <p14:creationId xmlns:p14="http://schemas.microsoft.com/office/powerpoint/2010/main" val="1266611209"/>
+        <p14:creationId xmlns:p14="http://schemas.microsoft.com/office/powerpoint/2010/main" val="3835696038"/>
       </p:ext>
     </p:extLst>
   </p:cSld>
@@ -7201,44 +7336,7 @@
             <p:ph type="title"/>
           </p:nvPr>
         </p:nvSpPr>
-        <p:spPr>
-          <a:xfrm>
-            <a:off x="504031" y="459031"/>
-            <a:ext cx="8568531" cy="1605265"/>
-          </a:xfrm>
-        </p:spPr>
-        <p:txBody>
-          <a:bodyPr/>
-          <a:lstStyle/>
-          <a:p>
-            <a:r>
-              <a:rPr lang="en-US" dirty="0" err="1" smtClean="0"/>
-              <a:t>WhaT</a:t>
-            </a:r>
-            <a:r>
-              <a:rPr lang="en-US" dirty="0" smtClean="0"/>
-              <a:t> IS E-BIRD?</a:t>
-            </a:r>
-            <a:endParaRPr lang="en-US" dirty="0"/>
-          </a:p>
-        </p:txBody>
-      </p:sp>
-      <p:sp>
-        <p:nvSpPr>
-          <p:cNvPr id="3" name="Content Placeholder 2"/>
-          <p:cNvSpPr>
-            <a:spLocks noGrp="1"/>
-          </p:cNvSpPr>
-          <p:nvPr>
-            <p:ph idx="1"/>
-          </p:nvPr>
-        </p:nvSpPr>
-        <p:spPr>
-          <a:xfrm>
-            <a:off x="504031" y="1747459"/>
-            <a:ext cx="8568531" cy="4022493"/>
-          </a:xfrm>
-        </p:spPr>
+        <p:spPr/>
         <p:txBody>
           <a:bodyPr>
             <a:normAutofit/>
@@ -7246,8 +7344,41 @@
           <a:lstStyle/>
           <a:p>
             <a:r>
+              <a:rPr lang="en-US" sz="4300" dirty="0" smtClean="0"/>
+              <a:t>what is citizen science?</a:t>
+            </a:r>
+            <a:endParaRPr lang="en-US" sz="4300" dirty="0"/>
+          </a:p>
+        </p:txBody>
+      </p:sp>
+      <p:sp>
+        <p:nvSpPr>
+          <p:cNvPr id="3" name="Content Placeholder 2"/>
+          <p:cNvSpPr>
+            <a:spLocks noGrp="1"/>
+          </p:cNvSpPr>
+          <p:nvPr>
+            <p:ph idx="1"/>
+          </p:nvPr>
+        </p:nvSpPr>
+        <p:spPr/>
+        <p:txBody>
+          <a:bodyPr/>
+          <a:lstStyle/>
+          <a:p>
+            <a:r>
+              <a:rPr lang="en-US" sz="2800" dirty="0"/>
+              <a:t>The public involvement in inquiry and discovery of new scientific </a:t>
+            </a:r>
+            <a:r>
               <a:rPr lang="en-US" sz="2800" dirty="0" smtClean="0"/>
-              <a:t>Citizen Science Project</a:t>
+              <a:t>knowledge</a:t>
+            </a:r>
+          </a:p>
+          <a:p>
+            <a:r>
+              <a:rPr lang="en-US" sz="2800" dirty="0" smtClean="0"/>
+              <a:t>Examples-</a:t>
             </a:r>
           </a:p>
           <a:p>
@@ -7256,7 +7387,7 @@
             </a:pPr>
             <a:r>
               <a:rPr lang="en-US" sz="2800" dirty="0" smtClean="0"/>
-              <a:t>	-Records species</a:t>
+              <a:t>      -Foldit Void Crushers</a:t>
             </a:r>
           </a:p>
           <a:p>
@@ -7265,7 +7396,7 @@
             </a:pPr>
             <a:r>
               <a:rPr lang="en-US" sz="2800" dirty="0" smtClean="0"/>
-              <a:t>	-Records numbers</a:t>
+              <a:t>      -Great Whale Count</a:t>
             </a:r>
           </a:p>
           <a:p>
@@ -7274,22 +7405,61 @@
             </a:pPr>
             <a:r>
               <a:rPr lang="en-US" sz="2800" dirty="0" smtClean="0"/>
-              <a:t>	-Records behavior</a:t>
+              <a:t>     -eBird</a:t>
             </a:r>
             <a:endParaRPr lang="en-US" sz="2800" dirty="0"/>
+          </a:p>
+          <a:p>
+            <a:endParaRPr lang="en-US" dirty="0"/>
           </a:p>
         </p:txBody>
       </p:sp>
       <p:pic>
         <p:nvPicPr>
-          <p:cNvPr id="4" name="Picture 2" descr="https://upload.wikimedia.org/wikipedia/commons/2/2d/Birdwatchers_taking_a_closer_look_through_their_binoculars.jpg"/>
+          <p:cNvPr id="4" name="Picture 3"/>
+          <p:cNvPicPr>
+            <a:picLocks noChangeAspect="1"/>
+          </p:cNvPicPr>
+          <p:nvPr/>
+        </p:nvPicPr>
+        <p:blipFill>
+          <a:blip r:embed="rId3">
+            <a:extLst>
+              <a:ext uri="{28A0092B-C50C-407E-A947-70E740481C1C}">
+                <a14:useLocalDpi xmlns:a14="http://schemas.microsoft.com/office/drawing/2010/main" val="0"/>
+              </a:ext>
+            </a:extLst>
+          </a:blip>
+          <a:stretch>
+            <a:fillRect/>
+          </a:stretch>
+        </p:blipFill>
+        <p:spPr>
+          <a:xfrm>
+            <a:off x="6694613" y="164236"/>
+            <a:ext cx="3154255" cy="2113002"/>
+          </a:xfrm>
+          <a:prstGeom prst="rect">
+            <a:avLst/>
+          </a:prstGeom>
+          <a:ln>
+            <a:noFill/>
+          </a:ln>
+          <a:effectLst>
+            <a:softEdge rad="112500"/>
+          </a:effectLst>
+        </p:spPr>
+      </p:pic>
+      <p:pic>
+        <p:nvPicPr>
+          <p:cNvPr id="3074" name="Picture 2" descr="https://lh6.googleusercontent.com/vmSqSzsPfyEP_OMi1q1IuQybleTGUNfU566qj3oV27PUyJK0xhw1swM4hj3Cp4L3IcYNgZoTmVTzcCiiWtGHIbI9GePqb_lGj6gO35FP3yRjoRf6Jt24ROGNtNjUVz7GZSHqNozxnQ"/>
           <p:cNvPicPr>
             <a:picLocks noChangeAspect="1" noChangeArrowheads="1"/>
           </p:cNvPicPr>
           <p:nvPr/>
         </p:nvPicPr>
         <p:blipFill>
-          <a:blip r:embed="rId3" cstate="print">
+          <a:blip r:embed="rId4" cstate="print">
             <a:extLst>
               <a:ext uri="{28A0092B-C50C-407E-A947-70E740481C1C}">
                 <a14:useLocalDpi xmlns:a14="http://schemas.microsoft.com/office/drawing/2010/main" val="0"/>
@@ -7303,13 +7473,18 @@
         </p:blipFill>
         <p:spPr bwMode="auto">
           <a:xfrm>
-            <a:off x="7003472" y="3576303"/>
-            <a:ext cx="2900507" cy="1950953"/>
+            <a:off x="6230037" y="4789727"/>
+            <a:ext cx="3567427" cy="2261200"/>
           </a:xfrm>
           <a:prstGeom prst="rect">
             <a:avLst/>
           </a:prstGeom>
-          <a:noFill/>
+          <a:ln>
+            <a:noFill/>
+          </a:ln>
+          <a:effectLst>
+            <a:softEdge rad="112500"/>
+          </a:effectLst>
           <a:extLst>
             <a:ext uri="{909E8E84-426E-40DD-AFC4-6F175D3DCCD1}">
               <a14:hiddenFill xmlns:a14="http://schemas.microsoft.com/office/drawing/2010/main">
@@ -7319,72 +7494,12 @@
               </a14:hiddenFill>
             </a:ext>
           </a:extLst>
-        </p:spPr>
-      </p:pic>
-      <p:pic>
-        <p:nvPicPr>
-          <p:cNvPr id="5" name="Picture 4"/>
-          <p:cNvPicPr>
-            <a:picLocks noChangeAspect="1"/>
-          </p:cNvPicPr>
-          <p:nvPr/>
-        </p:nvPicPr>
-        <p:blipFill>
-          <a:blip r:embed="rId4" cstate="print">
-            <a:extLst>
-              <a:ext uri="{28A0092B-C50C-407E-A947-70E740481C1C}">
-                <a14:useLocalDpi xmlns:a14="http://schemas.microsoft.com/office/drawing/2010/main" val="0"/>
-              </a:ext>
-            </a:extLst>
-          </a:blip>
-          <a:stretch>
-            <a:fillRect/>
-          </a:stretch>
-        </p:blipFill>
-        <p:spPr>
-          <a:xfrm>
-            <a:off x="4238466" y="322119"/>
-            <a:ext cx="3283085" cy="3117272"/>
-          </a:xfrm>
-          <a:prstGeom prst="rect">
-            <a:avLst/>
-          </a:prstGeom>
-        </p:spPr>
-      </p:pic>
-      <p:pic>
-        <p:nvPicPr>
-          <p:cNvPr id="6" name="Picture 5"/>
-          <p:cNvPicPr>
-            <a:picLocks noChangeAspect="1"/>
-          </p:cNvPicPr>
-          <p:nvPr/>
-        </p:nvPicPr>
-        <p:blipFill>
-          <a:blip r:embed="rId5" cstate="print">
-            <a:extLst>
-              <a:ext uri="{28A0092B-C50C-407E-A947-70E740481C1C}">
-                <a14:useLocalDpi xmlns:a14="http://schemas.microsoft.com/office/drawing/2010/main" val="0"/>
-              </a:ext>
-            </a:extLst>
-          </a:blip>
-          <a:stretch>
-            <a:fillRect/>
-          </a:stretch>
-        </p:blipFill>
-        <p:spPr>
-          <a:xfrm>
-            <a:off x="2555004" y="4914899"/>
-            <a:ext cx="4323777" cy="2442888"/>
-          </a:xfrm>
-          <a:prstGeom prst="rect">
-            <a:avLst/>
-          </a:prstGeom>
         </p:spPr>
       </p:pic>
     </p:spTree>
     <p:extLst>
       <p:ext uri="{BB962C8B-B14F-4D97-AF65-F5344CB8AC3E}">
-        <p14:creationId xmlns:p14="http://schemas.microsoft.com/office/powerpoint/2010/main" val="2144425737"/>
+        <p14:creationId xmlns:p14="http://schemas.microsoft.com/office/powerpoint/2010/main" val="1266611209"/>
       </p:ext>
     </p:extLst>
   </p:cSld>
@@ -7420,58 +7535,151 @@
       </p:grpSpPr>
       <p:sp>
         <p:nvSpPr>
-          <p:cNvPr id="48" name="TextShape 1"/>
-          <p:cNvSpPr txBox="1"/>
+          <p:cNvPr id="2" name="Title 1"/>
+          <p:cNvSpPr>
+            <a:spLocks noGrp="1"/>
+          </p:cNvSpPr>
+          <p:nvPr>
+            <p:ph type="title"/>
+          </p:nvPr>
+        </p:nvSpPr>
+        <p:spPr>
+          <a:xfrm>
+            <a:off x="504031" y="459031"/>
+            <a:ext cx="8568531" cy="1605265"/>
+          </a:xfrm>
+        </p:spPr>
+        <p:txBody>
+          <a:bodyPr>
+            <a:normAutofit/>
+          </a:bodyPr>
+          <a:lstStyle/>
+          <a:p>
+            <a:r>
+              <a:rPr lang="en-US" sz="4800" dirty="0" err="1" smtClean="0"/>
+              <a:t>WhaT</a:t>
+            </a:r>
+            <a:r>
+              <a:rPr lang="en-US" sz="4800" dirty="0" smtClean="0"/>
+              <a:t> IS E-BIRD?</a:t>
+            </a:r>
+            <a:endParaRPr lang="en-US" sz="4800" dirty="0"/>
+          </a:p>
+        </p:txBody>
+      </p:sp>
+      <p:sp>
+        <p:nvSpPr>
+          <p:cNvPr id="3" name="Content Placeholder 2"/>
+          <p:cNvSpPr>
+            <a:spLocks noGrp="1"/>
+          </p:cNvSpPr>
+          <p:nvPr>
+            <p:ph idx="1"/>
+          </p:nvPr>
+        </p:nvSpPr>
+        <p:spPr>
+          <a:xfrm>
+            <a:off x="504031" y="1747459"/>
+            <a:ext cx="8568531" cy="4022493"/>
+          </a:xfrm>
+        </p:spPr>
+        <p:txBody>
+          <a:bodyPr>
+            <a:normAutofit/>
+          </a:bodyPr>
+          <a:lstStyle/>
+          <a:p>
+            <a:r>
+              <a:rPr lang="en-US" sz="2800" dirty="0" smtClean="0"/>
+              <a:t>Citizen Science Project</a:t>
+            </a:r>
+          </a:p>
+          <a:p>
+            <a:pPr marL="0" indent="0">
+              <a:buNone/>
+            </a:pPr>
+            <a:r>
+              <a:rPr lang="en-US" sz="2800" dirty="0" smtClean="0"/>
+              <a:t>	-Records species</a:t>
+            </a:r>
+          </a:p>
+          <a:p>
+            <a:pPr marL="0" indent="0">
+              <a:buNone/>
+            </a:pPr>
+            <a:r>
+              <a:rPr lang="en-US" sz="2800" dirty="0" smtClean="0"/>
+              <a:t>	-Records numbers</a:t>
+            </a:r>
+          </a:p>
+          <a:p>
+            <a:pPr marL="0" indent="0">
+              <a:buNone/>
+            </a:pPr>
+            <a:r>
+              <a:rPr lang="en-US" sz="2800" dirty="0" smtClean="0"/>
+              <a:t>	-Records behavior</a:t>
+            </a:r>
+            <a:endParaRPr lang="en-US" sz="2800" dirty="0"/>
+          </a:p>
+        </p:txBody>
+      </p:sp>
+      <p:pic>
+        <p:nvPicPr>
+          <p:cNvPr id="4" name="Picture 2" descr="https://upload.wikimedia.org/wikipedia/commons/2/2d/Birdwatchers_taking_a_closer_look_through_their_binoculars.jpg"/>
+          <p:cNvPicPr>
+            <a:picLocks noChangeAspect="1" noChangeArrowheads="1"/>
+          </p:cNvPicPr>
           <p:nvPr/>
-        </p:nvSpPr>
-        <p:spPr>
-          <a:xfrm>
-            <a:off x="504000" y="301320"/>
-            <a:ext cx="9071640" cy="5851800"/>
+        </p:nvPicPr>
+        <p:blipFill>
+          <a:blip r:embed="rId3" cstate="print">
+            <a:extLst>
+              <a:ext uri="{28A0092B-C50C-407E-A947-70E740481C1C}">
+                <a14:useLocalDpi xmlns:a14="http://schemas.microsoft.com/office/drawing/2010/main" val="0"/>
+              </a:ext>
+            </a:extLst>
+          </a:blip>
+          <a:srcRect/>
+          <a:stretch>
+            <a:fillRect/>
+          </a:stretch>
+        </p:blipFill>
+        <p:spPr bwMode="auto">
+          <a:xfrm>
+            <a:off x="5384534" y="3136238"/>
+            <a:ext cx="2900507" cy="1950953"/>
           </a:xfrm>
           <a:prstGeom prst="rect">
             <a:avLst/>
           </a:prstGeom>
-          <a:noFill/>
           <a:ln>
             <a:noFill/>
           </a:ln>
-        </p:spPr>
-        <p:txBody>
-          <a:bodyPr lIns="0" tIns="0" rIns="0" bIns="0" anchor="ctr"/>
-          <a:lstStyle/>
-          <a:p>
-            <a:pPr algn="ctr"/>
-            <a:r>
-              <a:rPr lang="en-US" sz="3200" dirty="0">
-                <a:latin typeface="Arial"/>
-              </a:rPr>
-              <a:t>Presenting: Phoenix Eye</a:t>
-            </a:r>
-            <a:endParaRPr dirty="0"/>
-          </a:p>
-          <a:p>
-            <a:pPr algn="ctr"/>
-            <a:r>
-              <a:rPr lang="en-US" sz="3200" dirty="0">
-                <a:latin typeface="Arial"/>
-              </a:rPr>
-              <a:t>Need a logo/graphic here.</a:t>
-            </a:r>
-            <a:endParaRPr dirty="0"/>
-          </a:p>
-        </p:txBody>
-      </p:sp>
+          <a:effectLst>
+            <a:softEdge rad="112500"/>
+          </a:effectLst>
+          <a:extLst>
+            <a:ext uri="{909E8E84-426E-40DD-AFC4-6F175D3DCCD1}">
+              <a14:hiddenFill xmlns:a14="http://schemas.microsoft.com/office/drawing/2010/main">
+                <a:solidFill>
+                  <a:srgbClr val="FFFFFF"/>
+                </a:solidFill>
+              </a14:hiddenFill>
+            </a:ext>
+          </a:extLst>
+        </p:spPr>
+      </p:pic>
       <p:pic>
         <p:nvPicPr>
-          <p:cNvPr id="3" name="Picture 2"/>
+          <p:cNvPr id="5" name="Picture 4"/>
           <p:cNvPicPr>
             <a:picLocks noChangeAspect="1"/>
           </p:cNvPicPr>
           <p:nvPr/>
         </p:nvPicPr>
         <p:blipFill>
-          <a:blip r:embed="rId2" cstate="print">
+          <a:blip r:embed="rId4" cstate="print">
             <a:extLst>
               <a:ext uri="{28A0092B-C50C-407E-A947-70E740481C1C}">
                 <a14:useLocalDpi xmlns:a14="http://schemas.microsoft.com/office/drawing/2010/main" val="0"/>
@@ -7484,73 +7692,62 @@
         </p:blipFill>
         <p:spPr>
           <a:xfrm>
-            <a:off x="22225" y="1844799"/>
-            <a:ext cx="10058400" cy="5412340"/>
+            <a:off x="6602198" y="164760"/>
+            <a:ext cx="2799939" cy="2658527"/>
           </a:xfrm>
           <a:prstGeom prst="rect">
             <a:avLst/>
           </a:prstGeom>
+          <a:ln>
+            <a:noFill/>
+          </a:ln>
+          <a:effectLst>
+            <a:softEdge rad="112500"/>
+          </a:effectLst>
         </p:spPr>
       </p:pic>
-      <p:sp>
-        <p:nvSpPr>
-          <p:cNvPr id="2" name="Rectangle 1"/>
-          <p:cNvSpPr/>
+      <p:pic>
+        <p:nvPicPr>
+          <p:cNvPr id="6" name="Picture 5"/>
+          <p:cNvPicPr>
+            <a:picLocks noChangeAspect="1"/>
+          </p:cNvPicPr>
           <p:nvPr/>
-        </p:nvSpPr>
+        </p:nvPicPr>
+        <p:blipFill>
+          <a:blip r:embed="rId5" cstate="print">
+            <a:extLst>
+              <a:ext uri="{28A0092B-C50C-407E-A947-70E740481C1C}">
+                <a14:useLocalDpi xmlns:a14="http://schemas.microsoft.com/office/drawing/2010/main" val="0"/>
+              </a:ext>
+            </a:extLst>
+          </a:blip>
+          <a:stretch>
+            <a:fillRect/>
+          </a:stretch>
+        </p:blipFill>
         <p:spPr>
           <a:xfrm>
-            <a:off x="1375575" y="301320"/>
-            <a:ext cx="6802070" cy="1543479"/>
+            <a:off x="6130976" y="5342741"/>
+            <a:ext cx="3600735" cy="2034377"/>
           </a:xfrm>
           <a:prstGeom prst="rect">
             <a:avLst/>
           </a:prstGeom>
-          <a:noFill/>
-        </p:spPr>
-        <p:txBody>
-          <a:bodyPr wrap="square" lIns="91440" tIns="45720" rIns="91440" bIns="45720">
-            <a:prstTxWarp prst="textInflateTop">
-              <a:avLst/>
-            </a:prstTxWarp>
-            <a:spAutoFit/>
-          </a:bodyPr>
-          <a:lstStyle/>
-          <a:p>
-            <a:pPr algn="ctr"/>
-            <a:r>
-              <a:rPr lang="en-US" sz="5400" b="0" cap="none" spc="0" dirty="0" smtClean="0">
-                <a:ln w="0"/>
-                <a:solidFill>
-                  <a:schemeClr val="tx1"/>
-                </a:solidFill>
-                <a:effectLst>
-                  <a:outerShdw blurRad="38100" dist="19050" dir="2700000" algn="tl" rotWithShape="0">
-                    <a:schemeClr val="dk1">
-                      <a:alpha val="40000"/>
-                    </a:schemeClr>
-                  </a:outerShdw>
-                </a:effectLst>
-              </a:rPr>
-              <a:t>Phoenix Eye</a:t>
-            </a:r>
-            <a:endParaRPr lang="en-US" sz="5400" b="0" cap="none" spc="0" dirty="0">
-              <a:ln w="0"/>
-              <a:solidFill>
-                <a:schemeClr val="tx1"/>
-              </a:solidFill>
-              <a:effectLst>
-                <a:outerShdw blurRad="38100" dist="19050" dir="2700000" algn="tl" rotWithShape="0">
-                  <a:schemeClr val="dk1">
-                    <a:alpha val="40000"/>
-                  </a:schemeClr>
-                </a:outerShdw>
-              </a:effectLst>
-            </a:endParaRPr>
-          </a:p>
-        </p:txBody>
-      </p:sp>
+          <a:ln>
+            <a:noFill/>
+          </a:ln>
+          <a:effectLst>
+            <a:softEdge rad="112500"/>
+          </a:effectLst>
+        </p:spPr>
+      </p:pic>
     </p:spTree>
+    <p:extLst>
+      <p:ext uri="{BB962C8B-B14F-4D97-AF65-F5344CB8AC3E}">
+        <p14:creationId xmlns:p14="http://schemas.microsoft.com/office/powerpoint/2010/main" val="2144425737"/>
+      </p:ext>
+    </p:extLst>
   </p:cSld>
   <p:clrMapOvr>
     <a:masterClrMapping/>
@@ -7594,14 +7791,16 @@
         </p:nvSpPr>
         <p:spPr/>
         <p:txBody>
-          <a:bodyPr/>
-          <a:lstStyle/>
-          <a:p>
-            <a:r>
-              <a:rPr lang="en-US" dirty="0" smtClean="0"/>
+          <a:bodyPr>
+            <a:normAutofit/>
+          </a:bodyPr>
+          <a:lstStyle/>
+          <a:p>
+            <a:r>
+              <a:rPr lang="en-US" sz="4800" dirty="0" smtClean="0"/>
               <a:t>Purpose of Phoenix EYE</a:t>
             </a:r>
-            <a:endParaRPr lang="en-US" dirty="0"/>
+            <a:endParaRPr lang="en-US" sz="4800" dirty="0"/>
           </a:p>
         </p:txBody>
       </p:sp>
@@ -7718,14 +7917,16 @@
         </p:nvSpPr>
         <p:spPr/>
         <p:txBody>
-          <a:bodyPr/>
-          <a:lstStyle/>
-          <a:p>
-            <a:r>
-              <a:rPr lang="en-US" dirty="0" smtClean="0"/>
+          <a:bodyPr>
+            <a:normAutofit/>
+          </a:bodyPr>
+          <a:lstStyle/>
+          <a:p>
+            <a:r>
+              <a:rPr lang="en-US" sz="4800" dirty="0" smtClean="0"/>
               <a:t>Who needs phoenix eye?</a:t>
             </a:r>
-            <a:endParaRPr lang="en-US" dirty="0"/>
+            <a:endParaRPr lang="en-US" sz="4800" dirty="0"/>
           </a:p>
         </p:txBody>
       </p:sp>
@@ -7801,12 +8002,18 @@
         </p:blipFill>
         <p:spPr>
           <a:xfrm>
-            <a:off x="504031" y="4104409"/>
+            <a:off x="504031" y="4629065"/>
             <a:ext cx="3082875" cy="2279318"/>
           </a:xfrm>
           <a:prstGeom prst="rect">
             <a:avLst/>
           </a:prstGeom>
+          <a:ln>
+            <a:noFill/>
+          </a:ln>
+          <a:effectLst>
+            <a:softEdge rad="112500"/>
+          </a:effectLst>
         </p:spPr>
       </p:pic>
     </p:spTree>
@@ -7851,14 +8058,16 @@
         </p:nvSpPr>
         <p:spPr/>
         <p:txBody>
-          <a:bodyPr/>
-          <a:lstStyle/>
-          <a:p>
-            <a:r>
-              <a:rPr lang="en-US" dirty="0" smtClean="0"/>
+          <a:bodyPr>
+            <a:normAutofit/>
+          </a:bodyPr>
+          <a:lstStyle/>
+          <a:p>
+            <a:r>
+              <a:rPr lang="en-US" sz="4800" dirty="0" smtClean="0"/>
               <a:t>How it works</a:t>
             </a:r>
-            <a:endParaRPr lang="en-US" dirty="0"/>
+            <a:endParaRPr lang="en-US" sz="4800" dirty="0"/>
           </a:p>
         </p:txBody>
       </p:sp>
@@ -7874,7 +8083,7 @@
         </p:nvSpPr>
         <p:spPr>
           <a:xfrm>
-            <a:off x="504031" y="1296893"/>
+            <a:off x="504031" y="1912841"/>
             <a:ext cx="8568531" cy="4022493"/>
           </a:xfrm>
         </p:spPr>
@@ -7992,6 +8201,52 @@
             <a:reflection blurRad="12700" stA="38000" endPos="28000" dist="5000" dir="5400000" sy="-100000" algn="bl" rotWithShape="0"/>
           </a:effectLst>
           <a:extLst/>
+        </p:spPr>
+      </p:pic>
+      <p:pic>
+        <p:nvPicPr>
+          <p:cNvPr id="2050" name="Picture 2" descr="https://upload.wikimedia.org/wikipedia/commons/c/c3/Logo_ebird.png"/>
+          <p:cNvPicPr>
+            <a:picLocks noChangeAspect="1" noChangeArrowheads="1"/>
+          </p:cNvPicPr>
+          <p:nvPr/>
+        </p:nvPicPr>
+        <p:blipFill>
+          <a:blip r:embed="rId4">
+            <a:extLst>
+              <a:ext uri="{28A0092B-C50C-407E-A947-70E740481C1C}">
+                <a14:useLocalDpi xmlns:a14="http://schemas.microsoft.com/office/drawing/2010/main" val="0"/>
+              </a:ext>
+            </a:extLst>
+          </a:blip>
+          <a:srcRect/>
+          <a:stretch>
+            <a:fillRect/>
+          </a:stretch>
+        </p:blipFill>
+        <p:spPr bwMode="auto">
+          <a:xfrm>
+            <a:off x="7773834" y="383510"/>
+            <a:ext cx="2095500" cy="1343026"/>
+          </a:xfrm>
+          <a:prstGeom prst="rect">
+            <a:avLst/>
+          </a:prstGeom>
+          <a:ln>
+            <a:noFill/>
+          </a:ln>
+          <a:effectLst>
+            <a:softEdge rad="112500"/>
+          </a:effectLst>
+          <a:extLst>
+            <a:ext uri="{909E8E84-426E-40DD-AFC4-6F175D3DCCD1}">
+              <a14:hiddenFill xmlns:a14="http://schemas.microsoft.com/office/drawing/2010/main">
+                <a:solidFill>
+                  <a:srgbClr val="FFFFFF"/>
+                </a:solidFill>
+              </a14:hiddenFill>
+            </a:ext>
+          </a:extLst>
         </p:spPr>
       </p:pic>
     </p:spTree>
@@ -8043,40 +8298,42 @@
         </p:nvSpPr>
         <p:spPr/>
         <p:txBody>
-          <a:bodyPr/>
-          <a:lstStyle/>
-          <a:p>
-            <a:r>
-              <a:rPr lang="en-US" dirty="0" smtClean="0"/>
-              <a:t>Timeline for release</a:t>
-            </a:r>
-            <a:endParaRPr lang="en-US" dirty="0"/>
-          </a:p>
-        </p:txBody>
-      </p:sp>
-      <p:sp>
-        <p:nvSpPr>
-          <p:cNvPr id="3" name="Content Placeholder 2"/>
-          <p:cNvSpPr>
-            <a:spLocks noGrp="1"/>
-          </p:cNvSpPr>
-          <p:nvPr>
-            <p:ph idx="1"/>
-          </p:nvPr>
-        </p:nvSpPr>
-        <p:spPr>
-          <a:xfrm>
-            <a:off x="504031" y="1761849"/>
-            <a:ext cx="8568531" cy="4022493"/>
-          </a:xfrm>
-        </p:spPr>
-        <p:txBody>
           <a:bodyPr>
             <a:normAutofit/>
           </a:bodyPr>
           <a:lstStyle/>
           <a:p>
             <a:r>
+              <a:rPr lang="en-US" sz="4800" dirty="0" smtClean="0"/>
+              <a:t>Timeline for release</a:t>
+            </a:r>
+            <a:endParaRPr lang="en-US" sz="4800" dirty="0"/>
+          </a:p>
+        </p:txBody>
+      </p:sp>
+      <p:sp>
+        <p:nvSpPr>
+          <p:cNvPr id="3" name="Content Placeholder 2"/>
+          <p:cNvSpPr>
+            <a:spLocks noGrp="1"/>
+          </p:cNvSpPr>
+          <p:nvPr>
+            <p:ph idx="1"/>
+          </p:nvPr>
+        </p:nvSpPr>
+        <p:spPr>
+          <a:xfrm>
+            <a:off x="504031" y="1761849"/>
+            <a:ext cx="8568531" cy="4022493"/>
+          </a:xfrm>
+        </p:spPr>
+        <p:txBody>
+          <a:bodyPr>
+            <a:normAutofit/>
+          </a:bodyPr>
+          <a:lstStyle/>
+          <a:p>
+            <a:r>
               <a:rPr lang="en-US" sz="2800" dirty="0" smtClean="0"/>
               <a:t>Choose a technology: Android or mobile web based</a:t>
             </a:r>
@@ -8108,6 +8365,52 @@
           </a:p>
         </p:txBody>
       </p:sp>
+      <p:pic>
+        <p:nvPicPr>
+          <p:cNvPr id="1026" name="Picture 2" descr="http://orig13.deviantart.net/6c18/f/2013/065/b/e/android_00347174_by_waqaskhan47-d5x6z0t.png"/>
+          <p:cNvPicPr>
+            <a:picLocks noChangeAspect="1" noChangeArrowheads="1"/>
+          </p:cNvPicPr>
+          <p:nvPr/>
+        </p:nvPicPr>
+        <p:blipFill>
+          <a:blip r:embed="rId3" cstate="print">
+            <a:extLst>
+              <a:ext uri="{28A0092B-C50C-407E-A947-70E740481C1C}">
+                <a14:useLocalDpi xmlns:a14="http://schemas.microsoft.com/office/drawing/2010/main" val="0"/>
+              </a:ext>
+            </a:extLst>
+          </a:blip>
+          <a:srcRect/>
+          <a:stretch>
+            <a:fillRect/>
+          </a:stretch>
+        </p:blipFill>
+        <p:spPr bwMode="auto">
+          <a:xfrm>
+            <a:off x="7542532" y="0"/>
+            <a:ext cx="2538093" cy="1903570"/>
+          </a:xfrm>
+          <a:prstGeom prst="rect">
+            <a:avLst/>
+          </a:prstGeom>
+          <a:ln>
+            <a:noFill/>
+          </a:ln>
+          <a:effectLst>
+            <a:softEdge rad="112500"/>
+          </a:effectLst>
+          <a:extLst>
+            <a:ext uri="{909E8E84-426E-40DD-AFC4-6F175D3DCCD1}">
+              <a14:hiddenFill xmlns:a14="http://schemas.microsoft.com/office/drawing/2010/main">
+                <a:solidFill>
+                  <a:srgbClr val="FFFFFF"/>
+                </a:solidFill>
+              </a14:hiddenFill>
+            </a:ext>
+          </a:extLst>
+        </p:spPr>
+      </p:pic>
     </p:spTree>
     <p:extLst>
       <p:ext uri="{BB962C8B-B14F-4D97-AF65-F5344CB8AC3E}">

</xml_diff>